<commit_message>
final , can bo sung them ve du lieu, cai thien xem co tang so epoch khong
</commit_message>
<xml_diff>
--- a/Presentation1.pptx
+++ b/Presentation1.pptx
@@ -36,6 +36,12 @@
     <p:sldId id="314" r:id="rId29"/>
     <p:sldId id="312" r:id="rId30"/>
     <p:sldId id="315" r:id="rId31"/>
+    <p:sldId id="317" r:id="rId32"/>
+    <p:sldId id="318" r:id="rId33"/>
+    <p:sldId id="319" r:id="rId34"/>
+    <p:sldId id="320" r:id="rId35"/>
+    <p:sldId id="321" r:id="rId36"/>
+    <p:sldId id="323" r:id="rId37"/>
   </p:sldIdLst>
   <p:sldSz cx="12192000" cy="6858000"/>
   <p:notesSz cx="7103745" cy="10234295"/>
@@ -4353,31 +4359,31 @@
           </a:p>
           <a:p>
             <a:r>
-              <a:rPr lang="" altLang="en-US"/>
+              <a:rPr lang="en-US" altLang="en-US"/>
               <a:t>khi tham so share_voca duoc thiet lap thi ket hop ca 2:</a:t>
             </a:r>
-            <a:endParaRPr lang="" altLang="en-US"/>
-          </a:p>
-          <a:p>
-            <a:r>
-              <a:rPr lang="" altLang="en-US"/>
+            <a:endParaRPr lang="en-US" altLang="en-US"/>
+          </a:p>
+          <a:p>
+            <a:r>
+              <a:rPr lang="en-US" altLang="en-US"/>
               <a:t>training_voca: 10.084 = 10800 + &lt;unk&gt; + '' la &lt;padding&gt;, &lt;e&gt; ket thuc cau hoac tu, &lt;s&gt; bat dau cau hoac tu</a:t>
             </a:r>
-            <a:endParaRPr lang="" altLang="en-US"/>
-          </a:p>
-          <a:p>
-            <a:r>
-              <a:rPr lang="" altLang="en-US"/>
+            <a:endParaRPr lang="en-US" altLang="en-US"/>
+          </a:p>
+          <a:p>
+            <a:r>
+              <a:rPr lang="en-US" altLang="en-US"/>
               <a:t>testing_voca: 7389</a:t>
             </a:r>
-            <a:endParaRPr lang="" altLang="en-US"/>
-          </a:p>
-          <a:p>
-            <a:endParaRPr lang="" altLang="en-US"/>
-          </a:p>
-          <a:p>
-            <a:r>
-              <a:rPr lang="" altLang="en-US"/>
+            <a:endParaRPr lang="en-US" altLang="en-US"/>
+          </a:p>
+          <a:p>
+            <a:endParaRPr lang="en-US" altLang="en-US"/>
+          </a:p>
+          <a:p>
+            <a:r>
+              <a:rPr lang="en-US" altLang="en-US"/>
               <a:t>voi character: 41: a-z, 0-9, &lt;e&gt; , &lt;s&gt; , '', &lt;unk&gt;</a:t>
             </a:r>
             <a:endParaRPr lang="en-US" altLang="en-US"/>
@@ -6995,10 +7001,10 @@
           <a:bodyPr/>
           <a:p>
             <a:r>
-              <a:rPr lang="" altLang="en-US"/>
+              <a:rPr lang="en-US" altLang="en-US"/>
               <a:t>Danh gia accuracy, precision, recal</a:t>
             </a:r>
-            <a:endParaRPr lang="" altLang="en-US"/>
+            <a:endParaRPr lang="en-US" altLang="en-US"/>
           </a:p>
         </p:txBody>
       </p:sp>
@@ -7017,20 +7023,20 @@
           <a:bodyPr/>
           <a:p>
             <a:r>
-              <a:rPr lang="" altLang="en-US"/>
+              <a:rPr lang="en-US" altLang="en-US"/>
               <a:t>word, thi danh gia theo so tu</a:t>
             </a:r>
-            <a:endParaRPr lang="" altLang="en-US"/>
-          </a:p>
-          <a:p>
-            <a:r>
-              <a:rPr lang="" altLang="en-US"/>
+            <a:endParaRPr lang="en-US" altLang="en-US"/>
+          </a:p>
+          <a:p>
+            <a:r>
+              <a:rPr lang="en-US" altLang="en-US"/>
               <a:t>voi ki tu, thi danh gia theo so ki tu</a:t>
             </a:r>
-            <a:endParaRPr lang="" altLang="en-US"/>
-          </a:p>
-          <a:p>
-            <a:endParaRPr lang="" altLang="en-US"/>
+            <a:endParaRPr lang="en-US" altLang="en-US"/>
+          </a:p>
+          <a:p>
+            <a:endParaRPr lang="en-US" altLang="en-US"/>
           </a:p>
         </p:txBody>
       </p:sp>
@@ -7171,20 +7177,20 @@
           <a:bodyPr/>
           <a:p>
             <a:r>
-              <a:rPr lang="" altLang="en-US"/>
+              <a:rPr lang="en-US" altLang="en-US"/>
               <a:t>word xong roi moi den character</a:t>
             </a:r>
-            <a:endParaRPr lang="" altLang="en-US"/>
-          </a:p>
-          <a:p>
-            <a:endParaRPr lang="" altLang="en-US"/>
-          </a:p>
-          <a:p>
-            <a:r>
-              <a:rPr lang="" altLang="en-US"/>
+            <a:endParaRPr lang="en-US" altLang="en-US"/>
+          </a:p>
+          <a:p>
+            <a:endParaRPr lang="en-US" altLang="en-US"/>
+          </a:p>
+          <a:p>
+            <a:r>
+              <a:rPr lang="en-US" altLang="en-US"/>
               <a:t>decoder se dung khi den ki tu ket thuc hoac den 50</a:t>
             </a:r>
-            <a:endParaRPr lang="" altLang="en-US"/>
+            <a:endParaRPr lang="en-US" altLang="en-US"/>
           </a:p>
         </p:txBody>
       </p:sp>
@@ -7239,31 +7245,31 @@
           <a:bodyPr/>
           <a:p>
             <a:r>
-              <a:rPr lang="" altLang="en-US"/>
+              <a:rPr lang="en-US" altLang="en-US"/>
               <a:t>1 cach tao tu dien va xac dinh unk word</a:t>
             </a:r>
-            <a:endParaRPr lang="" altLang="en-US"/>
-          </a:p>
-          <a:p>
-            <a:r>
-              <a:rPr lang="" altLang="en-US"/>
+            <a:endParaRPr lang="en-US" altLang="en-US"/>
+          </a:p>
+          <a:p>
+            <a:r>
+              <a:rPr lang="en-US" altLang="en-US"/>
               <a:t>2 cach tinh accuracy, precision, recall</a:t>
             </a:r>
-            <a:endParaRPr lang="" altLang="en-US"/>
-          </a:p>
-          <a:p>
-            <a:r>
-              <a:rPr lang="" altLang="en-US"/>
+            <a:endParaRPr lang="en-US" altLang="en-US"/>
+          </a:p>
+          <a:p>
+            <a:r>
+              <a:rPr lang="en-US" altLang="en-US"/>
               <a:t>3 thu tu thuc hien</a:t>
             </a:r>
-            <a:endParaRPr lang="" altLang="en-US"/>
-          </a:p>
-          <a:p>
-            <a:r>
-              <a:rPr lang="" altLang="en-US"/>
+            <a:endParaRPr lang="en-US" altLang="en-US"/>
+          </a:p>
+          <a:p>
+            <a:r>
+              <a:rPr lang="en-US" altLang="en-US"/>
               <a:t>4 gioi han cua decoder</a:t>
             </a:r>
-            <a:endParaRPr lang="" altLang="en-US"/>
+            <a:endParaRPr lang="en-US" altLang="en-US"/>
           </a:p>
         </p:txBody>
       </p:sp>
@@ -7272,6 +7278,432 @@
   <p:clrMapOvr>
     <a:masterClrMapping/>
   </p:clrMapOvr>
+</p:sld>
+</file>
+
+<file path=ppt/slides/slide29.xml><?xml version="1.0" encoding="utf-8"?>
+<p:sld xmlns:a="http://schemas.openxmlformats.org/drawingml/2006/main" xmlns:r="http://schemas.openxmlformats.org/officeDocument/2006/relationships" xmlns:p="http://schemas.openxmlformats.org/presentationml/2006/main">
+  <p:cSld>
+    <p:spTree>
+      <p:nvGrpSpPr>
+        <p:cNvPr id="1" name=""/>
+        <p:cNvGrpSpPr/>
+        <p:nvPr/>
+      </p:nvGrpSpPr>
+      <p:grpSpPr>
+        <a:xfrm>
+          <a:off x="0" y="0"/>
+          <a:ext cx="0" cy="0"/>
+          <a:chOff x="0" y="0"/>
+          <a:chExt cx="0" cy="0"/>
+        </a:xfrm>
+      </p:grpSpPr>
+      <p:sp>
+        <p:nvSpPr>
+          <p:cNvPr id="191" name="CustomShape 1"/>
+          <p:cNvSpPr/>
+          <p:nvPr/>
+        </p:nvSpPr>
+        <p:spPr>
+          <a:xfrm>
+            <a:off x="838080" y="365040"/>
+            <a:ext cx="10514880" cy="1324800"/>
+          </a:xfrm>
+          <a:prstGeom prst="rect">
+            <a:avLst/>
+          </a:prstGeom>
+          <a:noFill/>
+          <a:ln>
+            <a:noFill/>
+          </a:ln>
+        </p:spPr>
+        <p:style>
+          <a:lnRef idx="0">
+            <a:srgbClr val="FFFFFF"/>
+          </a:lnRef>
+          <a:fillRef idx="0">
+            <a:srgbClr val="FFFFFF"/>
+          </a:fillRef>
+          <a:effectRef idx="0">
+            <a:srgbClr val="FFFFFF"/>
+          </a:effectRef>
+          <a:fontRef idx="minor"/>
+        </p:style>
+      </p:sp>
+      <p:sp>
+        <p:nvSpPr>
+          <p:cNvPr id="192" name="CustomShape 2"/>
+          <p:cNvSpPr/>
+          <p:nvPr/>
+        </p:nvSpPr>
+        <p:spPr>
+          <a:xfrm>
+            <a:off x="965080" y="490790"/>
+            <a:ext cx="10514880" cy="4350600"/>
+          </a:xfrm>
+          <a:prstGeom prst="rect">
+            <a:avLst/>
+          </a:prstGeom>
+          <a:noFill/>
+          <a:ln>
+            <a:noFill/>
+          </a:ln>
+        </p:spPr>
+        <p:style>
+          <a:lnRef idx="0">
+            <a:srgbClr val="FFFFFF"/>
+          </a:lnRef>
+          <a:fillRef idx="0">
+            <a:srgbClr val="FFFFFF"/>
+          </a:fillRef>
+          <a:effectRef idx="0">
+            <a:srgbClr val="FFFFFF"/>
+          </a:effectRef>
+          <a:fontRef idx="minor"/>
+        </p:style>
+        <p:txBody>
+          <a:bodyPr lIns="0" tIns="0" rIns="0" bIns="0">
+            <a:normAutofit/>
+          </a:bodyPr>
+          <a:p>
+            <a:pPr marL="431800" indent="-323850">
+              <a:lnSpc>
+                <a:spcPct val="100000"/>
+              </a:lnSpc>
+              <a:spcBef>
+                <a:spcPts val="1415"/>
+              </a:spcBef>
+              <a:buClr>
+                <a:srgbClr val="000000"/>
+              </a:buClr>
+              <a:buSzPct val="45000"/>
+              <a:buFont typeface="Wingdings" panose="05000000000000000000" pitchFamily="2" charset="2"/>
+              <a:buChar char=""/>
+            </a:pPr>
+            <a:r>
+              <a:rPr lang="en-US" sz="2800" b="0" strike="noStrike" spc="-1">
+                <a:solidFill>
+                  <a:srgbClr val="000000"/>
+                </a:solidFill>
+                <a:latin typeface="Calibri"/>
+              </a:rPr>
+              <a:t>Lỗi sai chính tả có quy tắc:</a:t>
+            </a:r>
+            <a:endParaRPr lang="en-US" sz="2800" b="0" strike="noStrike" spc="-1">
+              <a:latin typeface="Arial"/>
+            </a:endParaRPr>
+          </a:p>
+          <a:p>
+            <a:pPr marL="864235" lvl="1" indent="-323850">
+              <a:lnSpc>
+                <a:spcPct val="100000"/>
+              </a:lnSpc>
+              <a:spcBef>
+                <a:spcPts val="1135"/>
+              </a:spcBef>
+              <a:buClr>
+                <a:srgbClr val="000000"/>
+              </a:buClr>
+              <a:buFont typeface="StarSymbol"/>
+              <a:buAutoNum type="arabicParenR"/>
+            </a:pPr>
+            <a:r>
+              <a:rPr lang="en-US" sz="2000" b="0" strike="noStrike" spc="-1">
+                <a:solidFill>
+                  <a:srgbClr val="000000"/>
+                </a:solidFill>
+                <a:latin typeface="Calibri"/>
+              </a:rPr>
+              <a:t>Lỗi sai về dấu câu: + thiếu dấu, thừa dấu, thay thế dấu bằng một dấu khác.</a:t>
+            </a:r>
+            <a:endParaRPr lang="en-US" sz="2000" b="0" strike="noStrike" spc="-1">
+              <a:latin typeface="Arial"/>
+            </a:endParaRPr>
+          </a:p>
+          <a:p>
+            <a:pPr marL="2160270" lvl="4" indent="-215900">
+              <a:lnSpc>
+                <a:spcPct val="100000"/>
+              </a:lnSpc>
+              <a:spcBef>
+                <a:spcPts val="285"/>
+              </a:spcBef>
+              <a:buClr>
+                <a:srgbClr val="000000"/>
+              </a:buClr>
+              <a:buFont typeface="StarSymbol"/>
+              <a:buAutoNum type="arabicParenR"/>
+            </a:pPr>
+            <a:r>
+              <a:rPr lang="en-US" sz="2000" b="0" strike="noStrike" spc="-1">
+                <a:solidFill>
+                  <a:srgbClr val="000000"/>
+                </a:solidFill>
+                <a:latin typeface="Calibri"/>
+              </a:rPr>
+              <a:t>              + sai vị trí của dấu: hòa – hoà.</a:t>
+            </a:r>
+            <a:endParaRPr lang="en-US" sz="2000" b="0" strike="noStrike" spc="-1">
+              <a:latin typeface="Arial"/>
+            </a:endParaRPr>
+          </a:p>
+          <a:p>
+            <a:pPr marL="2160270" lvl="4" indent="-215900">
+              <a:lnSpc>
+                <a:spcPct val="100000"/>
+              </a:lnSpc>
+              <a:spcBef>
+                <a:spcPts val="285"/>
+              </a:spcBef>
+              <a:buClr>
+                <a:srgbClr val="000000"/>
+              </a:buClr>
+              <a:buFont typeface="StarSymbol"/>
+              <a:buAutoNum type="arabicParenR"/>
+            </a:pPr>
+            <a:r>
+              <a:rPr lang="en-US" sz="2000" b="0" strike="noStrike" spc="-1">
+                <a:solidFill>
+                  <a:srgbClr val="000000"/>
+                </a:solidFill>
+                <a:latin typeface="Calibri"/>
+              </a:rPr>
+              <a:t>              + dấu biểu cảm cuối câu.</a:t>
+            </a:r>
+            <a:endParaRPr lang="en-US" sz="2000" b="0" strike="noStrike" spc="-1">
+              <a:latin typeface="Arial"/>
+            </a:endParaRPr>
+          </a:p>
+          <a:p>
+            <a:pPr marL="864235" lvl="1" indent="-323850">
+              <a:lnSpc>
+                <a:spcPct val="100000"/>
+              </a:lnSpc>
+              <a:spcBef>
+                <a:spcPts val="1135"/>
+              </a:spcBef>
+              <a:buClr>
+                <a:srgbClr val="000000"/>
+              </a:buClr>
+              <a:buFont typeface="StarSymbol"/>
+              <a:buAutoNum type="arabicParenR"/>
+            </a:pPr>
+            <a:r>
+              <a:rPr lang="en-US" sz="2000" b="0" strike="noStrike" spc="-1">
+                <a:solidFill>
+                  <a:srgbClr val="000000"/>
+                </a:solidFill>
+                <a:latin typeface="Calibri"/>
+              </a:rPr>
+              <a:t>Lỗi sai về dấu cách: với các từ có nhiều hơn 2 từ :</a:t>
+            </a:r>
+            <a:endParaRPr lang="en-US" sz="2000" b="0" strike="noStrike" spc="-1">
+              <a:latin typeface="Arial"/>
+            </a:endParaRPr>
+          </a:p>
+          <a:p>
+            <a:pPr marL="1296035" lvl="2" indent="-287655">
+              <a:lnSpc>
+                <a:spcPct val="100000"/>
+              </a:lnSpc>
+              <a:spcBef>
+                <a:spcPts val="850"/>
+              </a:spcBef>
+              <a:buClr>
+                <a:srgbClr val="000000"/>
+              </a:buClr>
+              <a:buFont typeface="StarSymbol"/>
+              <a:buAutoNum type="arabicParenR"/>
+            </a:pPr>
+            <a:r>
+              <a:rPr lang="en-US" sz="1800" b="0" strike="noStrike" spc="-1">
+                <a:solidFill>
+                  <a:srgbClr val="000000"/>
+                </a:solidFill>
+                <a:latin typeface="Calibri"/>
+              </a:rPr>
+              <a:t>                            + mất dấu cách giữa các chữ trong trong từ: hoàng hôn → hoànghôn</a:t>
+            </a:r>
+            <a:endParaRPr lang="en-US" sz="1800" b="0" strike="noStrike" spc="-1">
+              <a:latin typeface="Arial"/>
+            </a:endParaRPr>
+          </a:p>
+          <a:p>
+            <a:pPr marL="1727835" lvl="3" indent="-215900">
+              <a:lnSpc>
+                <a:spcPct val="100000"/>
+              </a:lnSpc>
+              <a:spcBef>
+                <a:spcPts val="565"/>
+              </a:spcBef>
+              <a:buClr>
+                <a:srgbClr val="000000"/>
+              </a:buClr>
+              <a:buFont typeface="StarSymbol"/>
+              <a:buAutoNum type="arabicParenR"/>
+            </a:pPr>
+            <a:r>
+              <a:rPr lang="en-US" sz="1800" b="0" strike="noStrike" spc="-1">
+                <a:solidFill>
+                  <a:srgbClr val="000000"/>
+                </a:solidFill>
+                <a:latin typeface="Calibri"/>
+              </a:rPr>
+              <a:t>                      + chèn thêm dấu cách vào giữa từ: x ă n g, ph a, n h ơ t</a:t>
+            </a:r>
+            <a:endParaRPr lang="en-US" sz="1800" b="0" strike="noStrike" spc="-1">
+              <a:latin typeface="Arial"/>
+            </a:endParaRPr>
+          </a:p>
+          <a:p>
+            <a:pPr marL="864235" lvl="1" indent="-323850">
+              <a:lnSpc>
+                <a:spcPct val="100000"/>
+              </a:lnSpc>
+              <a:spcBef>
+                <a:spcPts val="1135"/>
+              </a:spcBef>
+              <a:buClr>
+                <a:srgbClr val="000000"/>
+              </a:buClr>
+              <a:buFont typeface="StarSymbol"/>
+              <a:buAutoNum type="arabicParenR"/>
+            </a:pPr>
+            <a:r>
+              <a:rPr lang="en-US" sz="2000" b="0" strike="noStrike" spc="-1">
+                <a:solidFill>
+                  <a:srgbClr val="000000"/>
+                </a:solidFill>
+                <a:latin typeface="Calibri"/>
+              </a:rPr>
+              <a:t>Lỗi sai về bàn phím: những ký tự có ví trị gần nhau trên bàn phim</a:t>
+            </a:r>
+            <a:endParaRPr lang="en-US" sz="2000" b="0" strike="noStrike" spc="-1">
+              <a:latin typeface="Arial"/>
+            </a:endParaRPr>
+          </a:p>
+          <a:p>
+            <a:pPr marL="1296035" lvl="2" indent="-287655">
+              <a:lnSpc>
+                <a:spcPct val="100000"/>
+              </a:lnSpc>
+              <a:spcBef>
+                <a:spcPts val="850"/>
+              </a:spcBef>
+              <a:buClr>
+                <a:srgbClr val="000000"/>
+              </a:buClr>
+              <a:buFont typeface="StarSymbol"/>
+              <a:buAutoNum type="arabicParenR"/>
+            </a:pPr>
+            <a:r>
+              <a:rPr lang="en-US" sz="1800" b="0" strike="noStrike" spc="-1">
+                <a:solidFill>
+                  <a:srgbClr val="000000"/>
+                </a:solidFill>
+                <a:latin typeface="Calibri"/>
+              </a:rPr>
+              <a:t>                            + q , w , z , x , s gần a </a:t>
+            </a:r>
+            <a:endParaRPr lang="en-US" sz="1800" b="0" strike="noStrike" spc="-1">
+              <a:latin typeface="Arial"/>
+            </a:endParaRPr>
+          </a:p>
+          <a:p>
+            <a:pPr marL="864235" lvl="1" indent="-323850">
+              <a:lnSpc>
+                <a:spcPct val="100000"/>
+              </a:lnSpc>
+              <a:spcBef>
+                <a:spcPts val="1135"/>
+              </a:spcBef>
+              <a:buClr>
+                <a:srgbClr val="000000"/>
+              </a:buClr>
+              <a:buFont typeface="StarSymbol"/>
+              <a:buAutoNum type="arabicParenR"/>
+            </a:pPr>
+            <a:r>
+              <a:rPr lang="en-US" sz="2000" b="0" strike="noStrike" spc="-1">
+                <a:solidFill>
+                  <a:srgbClr val="000000"/>
+                </a:solidFill>
+                <a:latin typeface="Calibri"/>
+              </a:rPr>
+              <a:t>Một số chữ cái, có cách phát âm, hơi giống nhau: ch-tr, l-n, x-s, y-i, r-d-gi  …..</a:t>
+            </a:r>
+            <a:endParaRPr lang="en-US" sz="2000" b="0" strike="noStrike" spc="-1">
+              <a:latin typeface="Arial"/>
+            </a:endParaRPr>
+          </a:p>
+          <a:p>
+            <a:pPr marL="864235" lvl="1" indent="-323850">
+              <a:lnSpc>
+                <a:spcPct val="100000"/>
+              </a:lnSpc>
+              <a:spcBef>
+                <a:spcPts val="1135"/>
+              </a:spcBef>
+              <a:buClr>
+                <a:srgbClr val="000000"/>
+              </a:buClr>
+              <a:buFont typeface="StarSymbol"/>
+              <a:buAutoNum type="arabicParenR"/>
+            </a:pPr>
+            <a:r>
+              <a:rPr lang="en-US" sz="2000" b="0" strike="noStrike" spc="-1">
+                <a:solidFill>
+                  <a:srgbClr val="000000"/>
+                </a:solidFill>
+                <a:latin typeface="Calibri"/>
+              </a:rPr>
+              <a:t>Xu hưởng bỏ chữ cái cuối câu đi: dễ thươn</a:t>
+            </a:r>
+            <a:endParaRPr lang="en-US" sz="2000" b="0" strike="noStrike" spc="-1">
+              <a:latin typeface="Arial"/>
+            </a:endParaRPr>
+          </a:p>
+          <a:p>
+            <a:pPr marL="864235" lvl="1" indent="-323850">
+              <a:lnSpc>
+                <a:spcPct val="100000"/>
+              </a:lnSpc>
+              <a:spcBef>
+                <a:spcPts val="1135"/>
+              </a:spcBef>
+              <a:buClr>
+                <a:srgbClr val="000000"/>
+              </a:buClr>
+              <a:buFont typeface="StarSymbol"/>
+              <a:buAutoNum type="arabicParenR"/>
+            </a:pPr>
+            <a:r>
+              <a:rPr lang="en-US" sz="2000" b="0" strike="noStrike" spc="-1">
+                <a:solidFill>
+                  <a:srgbClr val="000000"/>
+                </a:solidFill>
+                <a:latin typeface="Calibri"/>
+              </a:rPr>
+              <a:t>Ngoại lệ: xinh xăn - xưn xắn, tình yêu - tình iu. </a:t>
+            </a:r>
+            <a:endParaRPr lang="en-US" sz="2000" b="0" strike="noStrike" spc="-1">
+              <a:latin typeface="Arial"/>
+            </a:endParaRPr>
+          </a:p>
+        </p:txBody>
+      </p:sp>
+    </p:spTree>
+  </p:cSld>
+  <p:clrMapOvr>
+    <a:masterClrMapping/>
+  </p:clrMapOvr>
+  <p:timing>
+    <p:tnLst>
+      <p:par>
+        <p:cTn id="1" dur="indefinite" restart="never" nodeType="tmRoot"/>
+      </p:par>
+    </p:tnLst>
+  </p:timing>
 </p:sld>
 </file>
 
@@ -7357,6 +7789,1245 @@
           <a:p>
             <a:pPr algn="just"/>
             <a:endParaRPr lang="en-US" altLang="en-US"/>
+          </a:p>
+        </p:txBody>
+      </p:sp>
+    </p:spTree>
+  </p:cSld>
+  <p:clrMapOvr>
+    <a:masterClrMapping/>
+  </p:clrMapOvr>
+</p:sld>
+</file>
+
+<file path=ppt/slides/slide30.xml><?xml version="1.0" encoding="utf-8"?>
+<p:sld xmlns:a="http://schemas.openxmlformats.org/drawingml/2006/main" xmlns:r="http://schemas.openxmlformats.org/officeDocument/2006/relationships" xmlns:p="http://schemas.openxmlformats.org/presentationml/2006/main">
+  <p:cSld>
+    <p:spTree>
+      <p:nvGrpSpPr>
+        <p:cNvPr id="1" name=""/>
+        <p:cNvGrpSpPr/>
+        <p:nvPr/>
+      </p:nvGrpSpPr>
+      <p:grpSpPr>
+        <a:xfrm>
+          <a:off x="0" y="0"/>
+          <a:ext cx="0" cy="0"/>
+          <a:chOff x="0" y="0"/>
+          <a:chExt cx="0" cy="0"/>
+        </a:xfrm>
+      </p:grpSpPr>
+      <p:sp>
+        <p:nvSpPr>
+          <p:cNvPr id="193" name="CustomShape 1"/>
+          <p:cNvSpPr/>
+          <p:nvPr/>
+        </p:nvSpPr>
+        <p:spPr>
+          <a:xfrm>
+            <a:off x="838080" y="365040"/>
+            <a:ext cx="10514880" cy="1324800"/>
+          </a:xfrm>
+          <a:prstGeom prst="rect">
+            <a:avLst/>
+          </a:prstGeom>
+          <a:noFill/>
+          <a:ln>
+            <a:noFill/>
+          </a:ln>
+        </p:spPr>
+        <p:style>
+          <a:lnRef idx="0">
+            <a:srgbClr val="FFFFFF"/>
+          </a:lnRef>
+          <a:fillRef idx="0">
+            <a:srgbClr val="FFFFFF"/>
+          </a:fillRef>
+          <a:effectRef idx="0">
+            <a:srgbClr val="FFFFFF"/>
+          </a:effectRef>
+          <a:fontRef idx="minor"/>
+        </p:style>
+      </p:sp>
+      <p:sp>
+        <p:nvSpPr>
+          <p:cNvPr id="194" name="CustomShape 2"/>
+          <p:cNvSpPr/>
+          <p:nvPr/>
+        </p:nvSpPr>
+        <p:spPr>
+          <a:xfrm>
+            <a:off x="838080" y="1825560"/>
+            <a:ext cx="10514880" cy="4350600"/>
+          </a:xfrm>
+          <a:prstGeom prst="rect">
+            <a:avLst/>
+          </a:prstGeom>
+          <a:noFill/>
+          <a:ln>
+            <a:noFill/>
+          </a:ln>
+        </p:spPr>
+        <p:style>
+          <a:lnRef idx="0">
+            <a:srgbClr val="FFFFFF"/>
+          </a:lnRef>
+          <a:fillRef idx="0">
+            <a:srgbClr val="FFFFFF"/>
+          </a:fillRef>
+          <a:effectRef idx="0">
+            <a:srgbClr val="FFFFFF"/>
+          </a:effectRef>
+          <a:fontRef idx="minor"/>
+        </p:style>
+        <p:txBody>
+          <a:bodyPr lIns="0" tIns="0" rIns="0" bIns="0">
+            <a:normAutofit/>
+          </a:bodyPr>
+          <a:p>
+            <a:pPr marL="431800" indent="-323850">
+              <a:lnSpc>
+                <a:spcPct val="100000"/>
+              </a:lnSpc>
+              <a:spcBef>
+                <a:spcPts val="1415"/>
+              </a:spcBef>
+              <a:buClr>
+                <a:srgbClr val="000000"/>
+              </a:buClr>
+              <a:buSzPct val="45000"/>
+              <a:buFont typeface="Wingdings" panose="05000000000000000000" pitchFamily="2" charset="2"/>
+              <a:buChar char=""/>
+            </a:pPr>
+            <a:r>
+              <a:rPr lang="en-US" sz="2800" b="0" strike="noStrike" spc="-1">
+                <a:solidFill>
+                  <a:srgbClr val="000000"/>
+                </a:solidFill>
+                <a:latin typeface="Calibri"/>
+              </a:rPr>
+              <a:t>Dùng số thay cho chữ: </a:t>
+            </a:r>
+            <a:endParaRPr lang="en-US" sz="2800" b="0" strike="noStrike" spc="-1">
+              <a:latin typeface="Arial"/>
+            </a:endParaRPr>
+          </a:p>
+          <a:p>
+            <a:pPr marL="864235" lvl="1" indent="-323850">
+              <a:lnSpc>
+                <a:spcPct val="100000"/>
+              </a:lnSpc>
+              <a:spcBef>
+                <a:spcPts val="1135"/>
+              </a:spcBef>
+              <a:buClr>
+                <a:srgbClr val="000000"/>
+              </a:buClr>
+              <a:buSzPct val="75000"/>
+              <a:buFont typeface="Symbol" panose="05050102010706020507"/>
+              <a:buChar char=""/>
+            </a:pPr>
+            <a:r>
+              <a:rPr lang="en-US" sz="2000" b="0" strike="noStrike" spc="-1">
+                <a:solidFill>
+                  <a:srgbClr val="000000"/>
+                </a:solidFill>
+                <a:latin typeface="Calibri"/>
+              </a:rPr>
+              <a:t>ngũ độc = 5 độc.</a:t>
+            </a:r>
+            <a:endParaRPr lang="en-US" sz="2000" b="0" strike="noStrike" spc="-1">
+              <a:latin typeface="Arial"/>
+            </a:endParaRPr>
+          </a:p>
+          <a:p>
+            <a:pPr marL="864235" lvl="1" indent="-323850">
+              <a:lnSpc>
+                <a:spcPct val="100000"/>
+              </a:lnSpc>
+              <a:spcBef>
+                <a:spcPts val="1135"/>
+              </a:spcBef>
+              <a:buClr>
+                <a:srgbClr val="000000"/>
+              </a:buClr>
+              <a:buSzPct val="75000"/>
+              <a:buFont typeface="Symbol" panose="05050102010706020507"/>
+              <a:buChar char=""/>
+            </a:pPr>
+            <a:r>
+              <a:rPr lang="en-US" sz="2000" b="0" strike="noStrike" spc="-1">
+                <a:solidFill>
+                  <a:srgbClr val="000000"/>
+                </a:solidFill>
+                <a:latin typeface="Calibri"/>
+              </a:rPr>
+              <a:t>thất tình = 7 tình.</a:t>
+            </a:r>
+            <a:endParaRPr lang="en-US" sz="2000" b="0" strike="noStrike" spc="-1">
+              <a:latin typeface="Arial"/>
+            </a:endParaRPr>
+          </a:p>
+          <a:p>
+            <a:pPr marL="3023870" lvl="6" indent="-215900">
+              <a:lnSpc>
+                <a:spcPct val="100000"/>
+              </a:lnSpc>
+              <a:spcBef>
+                <a:spcPts val="285"/>
+              </a:spcBef>
+              <a:buClr>
+                <a:srgbClr val="000000"/>
+              </a:buClr>
+              <a:buSzPct val="45000"/>
+              <a:buFont typeface="Wingdings" panose="05000000000000000000" pitchFamily="2" charset="2"/>
+              <a:buChar char=""/>
+            </a:pPr>
+            <a:r>
+              <a:rPr lang="en-US" sz="2000" b="0" strike="noStrike" spc="-1">
+                <a:solidFill>
+                  <a:srgbClr val="000000"/>
+                </a:solidFill>
+                <a:latin typeface="Calibri"/>
+              </a:rPr>
+              <a:t> </a:t>
+            </a:r>
+            <a:endParaRPr lang="en-US" sz="2000" b="0" strike="noStrike" spc="-1">
+              <a:latin typeface="Arial"/>
+            </a:endParaRPr>
+          </a:p>
+          <a:p>
+            <a:pPr>
+              <a:lnSpc>
+                <a:spcPct val="100000"/>
+              </a:lnSpc>
+              <a:spcBef>
+                <a:spcPts val="1135"/>
+              </a:spcBef>
+            </a:pPr>
+            <a:endParaRPr lang="en-US" sz="2000" b="0" strike="noStrike" spc="-1">
+              <a:latin typeface="Arial"/>
+            </a:endParaRPr>
+          </a:p>
+        </p:txBody>
+      </p:sp>
+    </p:spTree>
+  </p:cSld>
+  <p:clrMapOvr>
+    <a:masterClrMapping/>
+  </p:clrMapOvr>
+  <p:timing>
+    <p:tnLst>
+      <p:par>
+        <p:cTn id="1" dur="indefinite" restart="never" nodeType="tmRoot"/>
+      </p:par>
+    </p:tnLst>
+  </p:timing>
+</p:sld>
+</file>
+
+<file path=ppt/slides/slide31.xml><?xml version="1.0" encoding="utf-8"?>
+<p:sld xmlns:a="http://schemas.openxmlformats.org/drawingml/2006/main" xmlns:r="http://schemas.openxmlformats.org/officeDocument/2006/relationships" xmlns:p="http://schemas.openxmlformats.org/presentationml/2006/main">
+  <p:cSld>
+    <p:spTree>
+      <p:nvGrpSpPr>
+        <p:cNvPr id="1" name=""/>
+        <p:cNvGrpSpPr/>
+        <p:nvPr/>
+      </p:nvGrpSpPr>
+      <p:grpSpPr>
+        <a:xfrm>
+          <a:off x="0" y="0"/>
+          <a:ext cx="0" cy="0"/>
+          <a:chOff x="0" y="0"/>
+          <a:chExt cx="0" cy="0"/>
+        </a:xfrm>
+      </p:grpSpPr>
+      <p:sp>
+        <p:nvSpPr>
+          <p:cNvPr id="195" name="CustomShape 1"/>
+          <p:cNvSpPr/>
+          <p:nvPr/>
+        </p:nvSpPr>
+        <p:spPr>
+          <a:xfrm>
+            <a:off x="838080" y="365040"/>
+            <a:ext cx="10514880" cy="1324800"/>
+          </a:xfrm>
+          <a:prstGeom prst="rect">
+            <a:avLst/>
+          </a:prstGeom>
+          <a:noFill/>
+          <a:ln>
+            <a:noFill/>
+          </a:ln>
+        </p:spPr>
+        <p:style>
+          <a:lnRef idx="0">
+            <a:srgbClr val="FFFFFF"/>
+          </a:lnRef>
+          <a:fillRef idx="0">
+            <a:srgbClr val="FFFFFF"/>
+          </a:fillRef>
+          <a:effectRef idx="0">
+            <a:srgbClr val="FFFFFF"/>
+          </a:effectRef>
+          <a:fontRef idx="minor"/>
+        </p:style>
+      </p:sp>
+      <p:sp>
+        <p:nvSpPr>
+          <p:cNvPr id="196" name="CustomShape 2"/>
+          <p:cNvSpPr/>
+          <p:nvPr/>
+        </p:nvSpPr>
+        <p:spPr>
+          <a:xfrm>
+            <a:off x="838080" y="1825560"/>
+            <a:ext cx="10514880" cy="4350600"/>
+          </a:xfrm>
+          <a:prstGeom prst="rect">
+            <a:avLst/>
+          </a:prstGeom>
+          <a:noFill/>
+          <a:ln>
+            <a:noFill/>
+          </a:ln>
+        </p:spPr>
+        <p:style>
+          <a:lnRef idx="0">
+            <a:srgbClr val="FFFFFF"/>
+          </a:lnRef>
+          <a:fillRef idx="0">
+            <a:srgbClr val="FFFFFF"/>
+          </a:fillRef>
+          <a:effectRef idx="0">
+            <a:srgbClr val="FFFFFF"/>
+          </a:effectRef>
+          <a:fontRef idx="minor"/>
+        </p:style>
+        <p:txBody>
+          <a:bodyPr lIns="0" tIns="0" rIns="0" bIns="0">
+            <a:normAutofit/>
+          </a:bodyPr>
+          <a:p>
+            <a:pPr marL="431800" indent="-323850">
+              <a:lnSpc>
+                <a:spcPct val="100000"/>
+              </a:lnSpc>
+              <a:spcBef>
+                <a:spcPts val="1415"/>
+              </a:spcBef>
+              <a:buClr>
+                <a:srgbClr val="000000"/>
+              </a:buClr>
+              <a:buSzPct val="45000"/>
+              <a:buFont typeface="Wingdings" panose="05000000000000000000" pitchFamily="2" charset="2"/>
+              <a:buChar char=""/>
+            </a:pPr>
+            <a:r>
+              <a:rPr lang="en-US" sz="2800" b="0" strike="noStrike" spc="-1">
+                <a:solidFill>
+                  <a:srgbClr val="000000"/>
+                </a:solidFill>
+                <a:latin typeface="Calibri"/>
+              </a:rPr>
+              <a:t>Viết tắt:</a:t>
+            </a:r>
+            <a:endParaRPr lang="en-US" sz="2800" b="0" strike="noStrike" spc="-1">
+              <a:latin typeface="Arial"/>
+            </a:endParaRPr>
+          </a:p>
+          <a:p>
+            <a:pPr marL="864235" lvl="1" indent="-323850">
+              <a:lnSpc>
+                <a:spcPct val="100000"/>
+              </a:lnSpc>
+              <a:spcBef>
+                <a:spcPts val="1135"/>
+              </a:spcBef>
+              <a:buClr>
+                <a:srgbClr val="000000"/>
+              </a:buClr>
+              <a:buSzPct val="75000"/>
+              <a:buFont typeface="Symbol" panose="05050102010706020507"/>
+              <a:buChar char=""/>
+            </a:pPr>
+            <a:r>
+              <a:rPr lang="en-US" sz="2000" b="0" strike="noStrike" spc="-1">
+                <a:solidFill>
+                  <a:srgbClr val="000000"/>
+                </a:solidFill>
+                <a:latin typeface="Calibri"/>
+              </a:rPr>
+              <a:t>Dùng các chữ cái đầu: BTC: ban tổ chức, CLB: câu lạc bộ, TP: thành phố….</a:t>
+            </a:r>
+            <a:endParaRPr lang="en-US" sz="2000" b="0" strike="noStrike" spc="-1">
+              <a:latin typeface="Arial"/>
+            </a:endParaRPr>
+          </a:p>
+          <a:p>
+            <a:pPr marL="864235" lvl="1" indent="-323850">
+              <a:lnSpc>
+                <a:spcPct val="100000"/>
+              </a:lnSpc>
+              <a:spcBef>
+                <a:spcPts val="1135"/>
+              </a:spcBef>
+              <a:buClr>
+                <a:srgbClr val="000000"/>
+              </a:buClr>
+              <a:buSzPct val="75000"/>
+              <a:buFont typeface="Symbol" panose="05050102010706020507"/>
+              <a:buChar char=""/>
+            </a:pPr>
+            <a:r>
+              <a:rPr lang="en-US" sz="2000" b="0" strike="noStrike" spc="-1">
+                <a:solidFill>
+                  <a:srgbClr val="000000"/>
+                </a:solidFill>
+                <a:latin typeface="Calibri"/>
+              </a:rPr>
+              <a:t>Với các chữ cái gồm 2 chữ dùng dấu /: đồng chí: đ/c; kình gửi: k/g.</a:t>
+            </a:r>
+            <a:endParaRPr lang="en-US" sz="2000" b="0" strike="noStrike" spc="-1">
+              <a:latin typeface="Arial"/>
+            </a:endParaRPr>
+          </a:p>
+          <a:p>
+            <a:pPr marL="864235" lvl="1" indent="-323850">
+              <a:lnSpc>
+                <a:spcPct val="100000"/>
+              </a:lnSpc>
+              <a:spcBef>
+                <a:spcPts val="1135"/>
+              </a:spcBef>
+              <a:buClr>
+                <a:srgbClr val="000000"/>
+              </a:buClr>
+              <a:buSzPct val="75000"/>
+              <a:buFont typeface="Symbol" panose="05050102010706020507"/>
+              <a:buChar char=""/>
+            </a:pPr>
+            <a:r>
+              <a:rPr lang="en-US" sz="2000" b="0" strike="noStrike" spc="-1">
+                <a:solidFill>
+                  <a:srgbClr val="000000"/>
+                </a:solidFill>
+                <a:latin typeface="Calibri"/>
+              </a:rPr>
+              <a:t>Viết tắt chỉ một chứ trong 2 chữ: công ty = cty hoặc c.ty</a:t>
+            </a:r>
+            <a:endParaRPr lang="en-US" sz="2000" b="0" strike="noStrike" spc="-1">
+              <a:latin typeface="Arial"/>
+            </a:endParaRPr>
+          </a:p>
+          <a:p>
+            <a:pPr marL="864235" lvl="1" indent="-323850">
+              <a:lnSpc>
+                <a:spcPct val="100000"/>
+              </a:lnSpc>
+              <a:spcBef>
+                <a:spcPts val="1135"/>
+              </a:spcBef>
+              <a:buClr>
+                <a:srgbClr val="000000"/>
+              </a:buClr>
+              <a:buSzPct val="75000"/>
+              <a:buFont typeface="Symbol" panose="05050102010706020507"/>
+              <a:buChar char=""/>
+            </a:pPr>
+            <a:r>
+              <a:rPr lang="en-US" sz="2000" b="0" strike="noStrike" spc="-1">
+                <a:solidFill>
+                  <a:srgbClr val="000000"/>
+                </a:solidFill>
+                <a:latin typeface="Calibri"/>
+              </a:rPr>
+              <a:t>dùng chữ đầu tiên và cuối cùng: trước = trc, được = dc </a:t>
+            </a:r>
+            <a:endParaRPr lang="en-US" sz="2000" b="0" strike="noStrike" spc="-1">
+              <a:latin typeface="Arial"/>
+            </a:endParaRPr>
+          </a:p>
+          <a:p>
+            <a:pPr marL="864235" lvl="1" indent="-323850">
+              <a:lnSpc>
+                <a:spcPct val="100000"/>
+              </a:lnSpc>
+              <a:spcBef>
+                <a:spcPts val="1135"/>
+              </a:spcBef>
+              <a:buClr>
+                <a:srgbClr val="000000"/>
+              </a:buClr>
+              <a:buSzPct val="75000"/>
+              <a:buFont typeface="Symbol" panose="05050102010706020507"/>
+              <a:buChar char=""/>
+            </a:pPr>
+            <a:r>
+              <a:rPr lang="en-US" sz="2000" b="0" strike="noStrike" spc="-1">
+                <a:solidFill>
+                  <a:srgbClr val="000000"/>
+                </a:solidFill>
+                <a:latin typeface="Calibri"/>
+              </a:rPr>
+              <a:t> </a:t>
+            </a:r>
+            <a:endParaRPr lang="en-US" sz="2000" b="0" strike="noStrike" spc="-1">
+              <a:latin typeface="Arial"/>
+            </a:endParaRPr>
+          </a:p>
+          <a:p>
+            <a:pPr marL="3023870" lvl="6" indent="-215900">
+              <a:lnSpc>
+                <a:spcPct val="100000"/>
+              </a:lnSpc>
+              <a:spcBef>
+                <a:spcPts val="285"/>
+              </a:spcBef>
+              <a:buClr>
+                <a:srgbClr val="000000"/>
+              </a:buClr>
+              <a:buSzPct val="45000"/>
+              <a:buFont typeface="Wingdings" panose="05000000000000000000" pitchFamily="2" charset="2"/>
+              <a:buChar char=""/>
+            </a:pPr>
+            <a:r>
+              <a:rPr lang="en-US" sz="2000" b="0" strike="noStrike" spc="-1">
+                <a:solidFill>
+                  <a:srgbClr val="000000"/>
+                </a:solidFill>
+                <a:latin typeface="Calibri"/>
+              </a:rPr>
+              <a:t> </a:t>
+            </a:r>
+            <a:endParaRPr lang="en-US" sz="2000" b="0" strike="noStrike" spc="-1">
+              <a:latin typeface="Arial"/>
+            </a:endParaRPr>
+          </a:p>
+          <a:p>
+            <a:pPr>
+              <a:lnSpc>
+                <a:spcPct val="100000"/>
+              </a:lnSpc>
+              <a:spcBef>
+                <a:spcPts val="1135"/>
+              </a:spcBef>
+            </a:pPr>
+            <a:endParaRPr lang="en-US" sz="2000" b="0" strike="noStrike" spc="-1">
+              <a:latin typeface="Arial"/>
+            </a:endParaRPr>
+          </a:p>
+        </p:txBody>
+      </p:sp>
+    </p:spTree>
+  </p:cSld>
+  <p:clrMapOvr>
+    <a:masterClrMapping/>
+  </p:clrMapOvr>
+  <p:timing>
+    <p:tnLst>
+      <p:par>
+        <p:cTn id="1" dur="indefinite" restart="never" nodeType="tmRoot"/>
+      </p:par>
+    </p:tnLst>
+  </p:timing>
+</p:sld>
+</file>
+
+<file path=ppt/slides/slide32.xml><?xml version="1.0" encoding="utf-8"?>
+<p:sld xmlns:a="http://schemas.openxmlformats.org/drawingml/2006/main" xmlns:r="http://schemas.openxmlformats.org/officeDocument/2006/relationships" xmlns:p="http://schemas.openxmlformats.org/presentationml/2006/main">
+  <p:cSld>
+    <p:spTree>
+      <p:nvGrpSpPr>
+        <p:cNvPr id="1" name=""/>
+        <p:cNvGrpSpPr/>
+        <p:nvPr/>
+      </p:nvGrpSpPr>
+      <p:grpSpPr>
+        <a:xfrm>
+          <a:off x="0" y="0"/>
+          <a:ext cx="0" cy="0"/>
+          <a:chOff x="0" y="0"/>
+          <a:chExt cx="0" cy="0"/>
+        </a:xfrm>
+      </p:grpSpPr>
+      <p:sp>
+        <p:nvSpPr>
+          <p:cNvPr id="197" name="CustomShape 1"/>
+          <p:cNvSpPr/>
+          <p:nvPr/>
+        </p:nvSpPr>
+        <p:spPr>
+          <a:xfrm>
+            <a:off x="838080" y="365040"/>
+            <a:ext cx="10514880" cy="1324800"/>
+          </a:xfrm>
+          <a:prstGeom prst="rect">
+            <a:avLst/>
+          </a:prstGeom>
+          <a:noFill/>
+          <a:ln>
+            <a:noFill/>
+          </a:ln>
+        </p:spPr>
+        <p:style>
+          <a:lnRef idx="0">
+            <a:srgbClr val="FFFFFF"/>
+          </a:lnRef>
+          <a:fillRef idx="0">
+            <a:srgbClr val="FFFFFF"/>
+          </a:fillRef>
+          <a:effectRef idx="0">
+            <a:srgbClr val="FFFFFF"/>
+          </a:effectRef>
+          <a:fontRef idx="minor"/>
+        </p:style>
+      </p:sp>
+      <p:sp>
+        <p:nvSpPr>
+          <p:cNvPr id="198" name="CustomShape 2"/>
+          <p:cNvSpPr/>
+          <p:nvPr/>
+        </p:nvSpPr>
+        <p:spPr>
+          <a:xfrm>
+            <a:off x="838080" y="1825560"/>
+            <a:ext cx="10514880" cy="4350600"/>
+          </a:xfrm>
+          <a:prstGeom prst="rect">
+            <a:avLst/>
+          </a:prstGeom>
+          <a:noFill/>
+          <a:ln>
+            <a:noFill/>
+          </a:ln>
+        </p:spPr>
+        <p:style>
+          <a:lnRef idx="0">
+            <a:srgbClr val="FFFFFF"/>
+          </a:lnRef>
+          <a:fillRef idx="0">
+            <a:srgbClr val="FFFFFF"/>
+          </a:fillRef>
+          <a:effectRef idx="0">
+            <a:srgbClr val="FFFFFF"/>
+          </a:effectRef>
+          <a:fontRef idx="minor"/>
+        </p:style>
+        <p:txBody>
+          <a:bodyPr lIns="0" tIns="0" rIns="0" bIns="0">
+            <a:normAutofit/>
+          </a:bodyPr>
+          <a:p>
+            <a:pPr marL="431800" indent="-323850">
+              <a:lnSpc>
+                <a:spcPct val="100000"/>
+              </a:lnSpc>
+              <a:spcBef>
+                <a:spcPts val="1415"/>
+              </a:spcBef>
+              <a:buClr>
+                <a:srgbClr val="000000"/>
+              </a:buClr>
+              <a:buSzPct val="45000"/>
+              <a:buFont typeface="Wingdings" panose="05000000000000000000" pitchFamily="2" charset="2"/>
+              <a:buChar char=""/>
+            </a:pPr>
+            <a:r>
+              <a:rPr lang="en-US" sz="2800" b="0" strike="noStrike" spc="-1">
+                <a:solidFill>
+                  <a:srgbClr val="000000"/>
+                </a:solidFill>
+                <a:latin typeface="Calibri"/>
+              </a:rPr>
+              <a:t>Tiếng lóng: </a:t>
+            </a:r>
+            <a:endParaRPr lang="en-US" sz="2800" b="0" strike="noStrike" spc="-1">
+              <a:latin typeface="Arial"/>
+            </a:endParaRPr>
+          </a:p>
+          <a:p>
+            <a:pPr marL="864235" lvl="1" indent="-323850">
+              <a:lnSpc>
+                <a:spcPct val="100000"/>
+              </a:lnSpc>
+              <a:spcBef>
+                <a:spcPts val="1135"/>
+              </a:spcBef>
+              <a:buClr>
+                <a:srgbClr val="000000"/>
+              </a:buClr>
+              <a:buSzPct val="75000"/>
+              <a:buFont typeface="Symbol" panose="05050102010706020507"/>
+              <a:buChar char=""/>
+            </a:pPr>
+            <a:r>
+              <a:rPr lang="en-US" sz="2000" b="0" strike="noStrike" spc="-1">
+                <a:solidFill>
+                  <a:srgbClr val="000000"/>
+                </a:solidFill>
+                <a:latin typeface="Calibri"/>
+              </a:rPr>
+              <a:t>Xoắn</a:t>
+            </a:r>
+            <a:endParaRPr lang="en-US" sz="2000" b="0" strike="noStrike" spc="-1">
+              <a:latin typeface="Arial"/>
+            </a:endParaRPr>
+          </a:p>
+          <a:p>
+            <a:pPr marL="864235" lvl="1" indent="-323850">
+              <a:lnSpc>
+                <a:spcPct val="100000"/>
+              </a:lnSpc>
+              <a:spcBef>
+                <a:spcPts val="1135"/>
+              </a:spcBef>
+              <a:buClr>
+                <a:srgbClr val="000000"/>
+              </a:buClr>
+              <a:buSzPct val="75000"/>
+              <a:buFont typeface="Symbol" panose="05050102010706020507"/>
+              <a:buChar char=""/>
+            </a:pPr>
+            <a:r>
+              <a:rPr lang="en-US" sz="2000" b="0" strike="noStrike" spc="-1">
+                <a:solidFill>
+                  <a:srgbClr val="000000"/>
+                </a:solidFill>
+                <a:latin typeface="Calibri"/>
+              </a:rPr>
+              <a:t>Quẩy (đồ ăn/ hình thức vui chơi giải trí )</a:t>
+            </a:r>
+            <a:endParaRPr lang="en-US" sz="2000" b="0" strike="noStrike" spc="-1">
+              <a:latin typeface="Arial"/>
+            </a:endParaRPr>
+          </a:p>
+          <a:p>
+            <a:pPr marL="864235" lvl="1" indent="-323850">
+              <a:lnSpc>
+                <a:spcPct val="100000"/>
+              </a:lnSpc>
+              <a:spcBef>
+                <a:spcPts val="1135"/>
+              </a:spcBef>
+              <a:buClr>
+                <a:srgbClr val="000000"/>
+              </a:buClr>
+              <a:buSzPct val="75000"/>
+              <a:buFont typeface="Symbol" panose="05050102010706020507"/>
+              <a:buChar char=""/>
+            </a:pPr>
+            <a:r>
+              <a:rPr lang="en-US" sz="2000" b="0" strike="noStrike" spc="-1">
+                <a:solidFill>
+                  <a:srgbClr val="000000"/>
+                </a:solidFill>
+                <a:latin typeface="Calibri"/>
+              </a:rPr>
+              <a:t>Thả thính ( cho cá /muốn thoát khỏi tính trạng cô đơn ăn )</a:t>
+            </a:r>
+            <a:endParaRPr lang="en-US" sz="2000" b="0" strike="noStrike" spc="-1">
+              <a:latin typeface="Arial"/>
+            </a:endParaRPr>
+          </a:p>
+          <a:p>
+            <a:pPr marL="864235" lvl="1" indent="-323850">
+              <a:lnSpc>
+                <a:spcPct val="100000"/>
+              </a:lnSpc>
+              <a:spcBef>
+                <a:spcPts val="1135"/>
+              </a:spcBef>
+              <a:buClr>
+                <a:srgbClr val="000000"/>
+              </a:buClr>
+              <a:buSzPct val="75000"/>
+              <a:buFont typeface="Symbol" panose="05050102010706020507"/>
+              <a:buChar char=""/>
+            </a:pPr>
+            <a:r>
+              <a:rPr lang="en-US" sz="2000" b="0" strike="noStrike" spc="-1">
+                <a:solidFill>
+                  <a:srgbClr val="000000"/>
+                </a:solidFill>
+                <a:latin typeface="Calibri"/>
+              </a:rPr>
+              <a:t>Hem = không a</a:t>
+            </a:r>
+            <a:endParaRPr lang="en-US" sz="2000" b="0" strike="noStrike" spc="-1">
+              <a:latin typeface="Arial"/>
+            </a:endParaRPr>
+          </a:p>
+          <a:p>
+            <a:pPr marL="864235" lvl="1" indent="-323850">
+              <a:lnSpc>
+                <a:spcPct val="100000"/>
+              </a:lnSpc>
+              <a:spcBef>
+                <a:spcPts val="1135"/>
+              </a:spcBef>
+              <a:buClr>
+                <a:srgbClr val="000000"/>
+              </a:buClr>
+              <a:buSzPct val="75000"/>
+              <a:buFont typeface="Symbol" panose="05050102010706020507"/>
+              <a:buChar char=""/>
+            </a:pPr>
+            <a:r>
+              <a:rPr lang="en-US" sz="2000" b="0" strike="noStrike" spc="-1">
+                <a:solidFill>
+                  <a:srgbClr val="000000"/>
+                </a:solidFill>
+                <a:latin typeface="Calibri"/>
+              </a:rPr>
+              <a:t>Vãi : bộc lộ cảm xúc thái quá với sự vật hiện tương gì đó.</a:t>
+            </a:r>
+            <a:endParaRPr lang="en-US" sz="2000" b="0" strike="noStrike" spc="-1">
+              <a:latin typeface="Arial"/>
+            </a:endParaRPr>
+          </a:p>
+          <a:p>
+            <a:pPr marL="864235" lvl="1" indent="-323850">
+              <a:lnSpc>
+                <a:spcPct val="100000"/>
+              </a:lnSpc>
+              <a:spcBef>
+                <a:spcPts val="1135"/>
+              </a:spcBef>
+              <a:buClr>
+                <a:srgbClr val="000000"/>
+              </a:buClr>
+              <a:buSzPct val="75000"/>
+              <a:buFont typeface="Symbol" panose="05050102010706020507"/>
+              <a:buChar char=""/>
+            </a:pPr>
+            <a:r>
+              <a:rPr lang="en-US" sz="2000" b="0" strike="noStrike" spc="-1">
+                <a:solidFill>
+                  <a:srgbClr val="000000"/>
+                </a:solidFill>
+                <a:latin typeface="Calibri"/>
+              </a:rPr>
+              <a:t>Sửu nhị, hoy,  ………</a:t>
+            </a:r>
+            <a:endParaRPr lang="en-US" sz="2000" b="0" strike="noStrike" spc="-1">
+              <a:latin typeface="Arial"/>
+            </a:endParaRPr>
+          </a:p>
+          <a:p>
+            <a:pPr marL="864235" lvl="1" indent="-323850">
+              <a:lnSpc>
+                <a:spcPct val="100000"/>
+              </a:lnSpc>
+              <a:spcBef>
+                <a:spcPts val="1135"/>
+              </a:spcBef>
+              <a:buClr>
+                <a:srgbClr val="000000"/>
+              </a:buClr>
+              <a:buSzPct val="75000"/>
+              <a:buFont typeface="Symbol" panose="05050102010706020507"/>
+              <a:buChar char=""/>
+            </a:pPr>
+            <a:r>
+              <a:rPr lang="en-US" sz="2000" b="0" strike="noStrike" spc="-1">
+                <a:solidFill>
+                  <a:srgbClr val="000000"/>
+                </a:solidFill>
+                <a:latin typeface="Calibri"/>
+              </a:rPr>
+              <a:t>Sạc  (bị ho mạnh hoặc hắt hơi liên tục do có vật gì lọt vào làm cho tắc nghẽn khí quản một cách đột ngột/ thể hiện sự thất vọng)</a:t>
+            </a:r>
+            <a:endParaRPr lang="en-US" sz="2000" b="0" strike="noStrike" spc="-1">
+              <a:latin typeface="Arial"/>
+            </a:endParaRPr>
+          </a:p>
+          <a:p>
+            <a:pPr>
+              <a:lnSpc>
+                <a:spcPct val="100000"/>
+              </a:lnSpc>
+              <a:spcBef>
+                <a:spcPts val="1135"/>
+              </a:spcBef>
+            </a:pPr>
+            <a:endParaRPr lang="en-US" sz="2000" b="0" strike="noStrike" spc="-1">
+              <a:latin typeface="Arial"/>
+            </a:endParaRPr>
+          </a:p>
+        </p:txBody>
+      </p:sp>
+    </p:spTree>
+  </p:cSld>
+  <p:clrMapOvr>
+    <a:masterClrMapping/>
+  </p:clrMapOvr>
+  <p:timing>
+    <p:tnLst>
+      <p:par>
+        <p:cTn id="1" dur="indefinite" restart="never" nodeType="tmRoot"/>
+      </p:par>
+    </p:tnLst>
+  </p:timing>
+</p:sld>
+</file>
+
+<file path=ppt/slides/slide33.xml><?xml version="1.0" encoding="utf-8"?>
+<p:sld xmlns:a="http://schemas.openxmlformats.org/drawingml/2006/main" xmlns:r="http://schemas.openxmlformats.org/officeDocument/2006/relationships" xmlns:p="http://schemas.openxmlformats.org/presentationml/2006/main">
+  <p:cSld>
+    <p:spTree>
+      <p:nvGrpSpPr>
+        <p:cNvPr id="1" name=""/>
+        <p:cNvGrpSpPr/>
+        <p:nvPr/>
+      </p:nvGrpSpPr>
+      <p:grpSpPr>
+        <a:xfrm>
+          <a:off x="0" y="0"/>
+          <a:ext cx="0" cy="0"/>
+          <a:chOff x="0" y="0"/>
+          <a:chExt cx="0" cy="0"/>
+        </a:xfrm>
+      </p:grpSpPr>
+      <p:sp>
+        <p:nvSpPr>
+          <p:cNvPr id="199" name="CustomShape 1"/>
+          <p:cNvSpPr/>
+          <p:nvPr/>
+        </p:nvSpPr>
+        <p:spPr>
+          <a:xfrm>
+            <a:off x="838080" y="365040"/>
+            <a:ext cx="10514880" cy="1324800"/>
+          </a:xfrm>
+          <a:prstGeom prst="rect">
+            <a:avLst/>
+          </a:prstGeom>
+          <a:noFill/>
+          <a:ln>
+            <a:noFill/>
+          </a:ln>
+        </p:spPr>
+        <p:style>
+          <a:lnRef idx="0">
+            <a:srgbClr val="FFFFFF"/>
+          </a:lnRef>
+          <a:fillRef idx="0">
+            <a:srgbClr val="FFFFFF"/>
+          </a:fillRef>
+          <a:effectRef idx="0">
+            <a:srgbClr val="FFFFFF"/>
+          </a:effectRef>
+          <a:fontRef idx="minor"/>
+        </p:style>
+      </p:sp>
+      <p:sp>
+        <p:nvSpPr>
+          <p:cNvPr id="200" name="CustomShape 2"/>
+          <p:cNvSpPr/>
+          <p:nvPr/>
+        </p:nvSpPr>
+        <p:spPr>
+          <a:xfrm>
+            <a:off x="838080" y="1825560"/>
+            <a:ext cx="10514880" cy="4350600"/>
+          </a:xfrm>
+          <a:prstGeom prst="rect">
+            <a:avLst/>
+          </a:prstGeom>
+          <a:noFill/>
+          <a:ln>
+            <a:noFill/>
+          </a:ln>
+        </p:spPr>
+        <p:style>
+          <a:lnRef idx="0">
+            <a:srgbClr val="FFFFFF"/>
+          </a:lnRef>
+          <a:fillRef idx="0">
+            <a:srgbClr val="FFFFFF"/>
+          </a:fillRef>
+          <a:effectRef idx="0">
+            <a:srgbClr val="FFFFFF"/>
+          </a:effectRef>
+          <a:fontRef idx="minor"/>
+        </p:style>
+        <p:txBody>
+          <a:bodyPr lIns="0" tIns="0" rIns="0" bIns="0">
+            <a:normAutofit/>
+          </a:bodyPr>
+          <a:p>
+            <a:pPr marL="431800" indent="-323850">
+              <a:lnSpc>
+                <a:spcPct val="100000"/>
+              </a:lnSpc>
+              <a:spcBef>
+                <a:spcPts val="1415"/>
+              </a:spcBef>
+              <a:buClr>
+                <a:srgbClr val="000000"/>
+              </a:buClr>
+              <a:buSzPct val="45000"/>
+              <a:buFont typeface="Wingdings" panose="05000000000000000000" pitchFamily="2" charset="2"/>
+              <a:buChar char=""/>
+            </a:pPr>
+            <a:r>
+              <a:rPr lang="en-US" sz="2800" b="0" strike="noStrike" spc="-1">
+                <a:solidFill>
+                  <a:srgbClr val="000000"/>
+                </a:solidFill>
+                <a:latin typeface="Calibri"/>
+              </a:rPr>
+              <a:t>Teen code:  </a:t>
+            </a:r>
+            <a:endParaRPr lang="en-US" sz="2800" b="0" strike="noStrike" spc="-1">
+              <a:latin typeface="Arial"/>
+            </a:endParaRPr>
+          </a:p>
+          <a:p>
+            <a:pPr marL="864235" lvl="1" indent="-323850">
+              <a:lnSpc>
+                <a:spcPct val="100000"/>
+              </a:lnSpc>
+              <a:spcBef>
+                <a:spcPts val="1135"/>
+              </a:spcBef>
+              <a:buClr>
+                <a:srgbClr val="000000"/>
+              </a:buClr>
+              <a:buFont typeface="StarSymbol"/>
+              <a:buAutoNum type="arabicParenR"/>
+            </a:pPr>
+            <a:r>
+              <a:rPr lang="en-US" sz="2000" b="0" strike="noStrike" spc="-1">
+                <a:solidFill>
+                  <a:srgbClr val="000000"/>
+                </a:solidFill>
+                <a:latin typeface="Calibri"/>
+              </a:rPr>
+              <a:t>chuyển một số chứ cái sang dạng khác: ph-f , ng – q/p, gi/d- j/z, c – k, qu-w …..</a:t>
+            </a:r>
+            <a:endParaRPr lang="en-US" sz="2000" b="0" strike="noStrike" spc="-1">
+              <a:latin typeface="Arial"/>
+            </a:endParaRPr>
+          </a:p>
+          <a:p>
+            <a:pPr marL="864235" lvl="1" indent="-323850">
+              <a:lnSpc>
+                <a:spcPct val="100000"/>
+              </a:lnSpc>
+              <a:spcBef>
+                <a:spcPts val="1135"/>
+              </a:spcBef>
+              <a:buClr>
+                <a:srgbClr val="000000"/>
+              </a:buClr>
+              <a:buFont typeface="StarSymbol"/>
+              <a:buAutoNum type="arabicParenR"/>
+            </a:pPr>
+            <a:r>
+              <a:rPr lang="en-US" sz="2000" b="0" strike="noStrike" spc="-1">
+                <a:solidFill>
+                  <a:srgbClr val="000000"/>
+                </a:solidFill>
+                <a:latin typeface="Calibri"/>
+              </a:rPr>
+              <a:t>chuyển chữ cái sang chữ số: 4` - phò, 4 là chữ a…. </a:t>
+            </a:r>
+            <a:endParaRPr lang="en-US" sz="2000" b="0" strike="noStrike" spc="-1">
+              <a:latin typeface="Arial"/>
+            </a:endParaRPr>
+          </a:p>
+          <a:p>
+            <a:pPr marL="864235" lvl="1" indent="-323850">
+              <a:lnSpc>
+                <a:spcPct val="100000"/>
+              </a:lnSpc>
+              <a:spcBef>
+                <a:spcPts val="1135"/>
+              </a:spcBef>
+              <a:buClr>
+                <a:srgbClr val="000000"/>
+              </a:buClr>
+              <a:buFont typeface="StarSymbol"/>
+              <a:buAutoNum type="arabicParenR"/>
+            </a:pPr>
+            <a:r>
+              <a:rPr lang="en-US" sz="2000" b="0" strike="noStrike" spc="-1">
+                <a:solidFill>
+                  <a:srgbClr val="000000"/>
+                </a:solidFill>
+                <a:latin typeface="Calibri"/>
+              </a:rPr>
+              <a:t>viết tắt: ko/k – không, dk/dc – được, gi – j.</a:t>
+            </a:r>
+            <a:endParaRPr lang="en-US" sz="2000" b="0" strike="noStrike" spc="-1">
+              <a:latin typeface="Arial"/>
+            </a:endParaRPr>
+          </a:p>
+          <a:p>
+            <a:pPr marL="864235" lvl="1" indent="-323850">
+              <a:lnSpc>
+                <a:spcPct val="100000"/>
+              </a:lnSpc>
+              <a:spcBef>
+                <a:spcPts val="1135"/>
+              </a:spcBef>
+              <a:buClr>
+                <a:srgbClr val="000000"/>
+              </a:buClr>
+              <a:buFont typeface="StarSymbol"/>
+              <a:buAutoNum type="arabicParenR"/>
+            </a:pPr>
+            <a:r>
+              <a:rPr lang="en-US" sz="2000" b="0" strike="noStrike" spc="-1">
+                <a:solidFill>
+                  <a:srgbClr val="000000"/>
+                </a:solidFill>
+                <a:latin typeface="Calibri"/>
+              </a:rPr>
+              <a:t>dùng dấu thay cho chữ viết tắt: huyền - `, sắc - ‘</a:t>
+            </a:r>
+            <a:endParaRPr lang="en-US" sz="2000" b="0" strike="noStrike" spc="-1">
+              <a:latin typeface="Arial"/>
+            </a:endParaRPr>
+          </a:p>
+          <a:p>
+            <a:pPr marL="864235" lvl="1" indent="-323850">
+              <a:lnSpc>
+                <a:spcPct val="100000"/>
+              </a:lnSpc>
+              <a:spcBef>
+                <a:spcPts val="1135"/>
+              </a:spcBef>
+              <a:buClr>
+                <a:srgbClr val="000000"/>
+              </a:buClr>
+              <a:buFont typeface="StarSymbol"/>
+              <a:buAutoNum type="arabicParenR"/>
+            </a:pPr>
+            <a:r>
+              <a:rPr lang="en-US" sz="2000" b="0" strike="noStrike" spc="-1">
+                <a:solidFill>
+                  <a:srgbClr val="000000"/>
+                </a:solidFill>
+                <a:latin typeface="Calibri"/>
+              </a:rPr>
+              <a:t>kết hợp các kí tự đặc biệt để tạo chứ: đ --- +); d ---- |)..</a:t>
+            </a:r>
+            <a:endParaRPr lang="en-US" sz="2000" b="0" strike="noStrike" spc="-1">
+              <a:latin typeface="Arial"/>
+            </a:endParaRPr>
+          </a:p>
+          <a:p>
+            <a:pPr>
+              <a:lnSpc>
+                <a:spcPct val="100000"/>
+              </a:lnSpc>
+              <a:spcBef>
+                <a:spcPts val="1135"/>
+              </a:spcBef>
+            </a:pPr>
+            <a:endParaRPr lang="en-US" sz="2000" b="0" strike="noStrike" spc="-1">
+              <a:latin typeface="Arial"/>
+            </a:endParaRPr>
+          </a:p>
+        </p:txBody>
+      </p:sp>
+    </p:spTree>
+  </p:cSld>
+  <p:clrMapOvr>
+    <a:masterClrMapping/>
+  </p:clrMapOvr>
+  <p:timing>
+    <p:tnLst>
+      <p:par>
+        <p:cTn id="1" dur="indefinite" restart="never" nodeType="tmRoot"/>
+      </p:par>
+    </p:tnLst>
+  </p:timing>
+</p:sld>
+</file>
+
+<file path=ppt/slides/slide34.xml><?xml version="1.0" encoding="utf-8"?>
+<p:sld xmlns:a="http://schemas.openxmlformats.org/drawingml/2006/main" xmlns:r="http://schemas.openxmlformats.org/officeDocument/2006/relationships" xmlns:p="http://schemas.openxmlformats.org/presentationml/2006/main">
+  <p:cSld>
+    <p:spTree>
+      <p:nvGrpSpPr>
+        <p:cNvPr id="1" name=""/>
+        <p:cNvGrpSpPr/>
+        <p:nvPr/>
+      </p:nvGrpSpPr>
+      <p:grpSpPr/>
+      <p:sp>
+        <p:nvSpPr>
+          <p:cNvPr id="4" name="Title 3"/>
+          <p:cNvSpPr>
+            <a:spLocks noGrp="1"/>
+          </p:cNvSpPr>
+          <p:nvPr>
+            <p:ph type="title"/>
+          </p:nvPr>
+        </p:nvSpPr>
+        <p:spPr/>
+        <p:txBody>
+          <a:bodyPr/>
+          <a:p>
+            <a:endParaRPr lang="en-US"/>
+          </a:p>
+        </p:txBody>
+      </p:sp>
+      <p:sp>
+        <p:nvSpPr>
+          <p:cNvPr id="5" name="Content Placeholder 4"/>
+          <p:cNvSpPr>
+            <a:spLocks noGrp="1"/>
+          </p:cNvSpPr>
+          <p:nvPr>
+            <p:ph idx="1"/>
+          </p:nvPr>
+        </p:nvSpPr>
+        <p:spPr/>
+        <p:txBody>
+          <a:bodyPr/>
+          <a:p>
+            <a:r>
+              <a:rPr lang="" altLang="en-US"/>
+              <a:t>Từ chứa nhiều từ thì bỏ dấu cách giữa: một cách ngẫu nhiên</a:t>
+            </a:r>
+            <a:endParaRPr lang="" altLang="en-US"/>
+          </a:p>
+          <a:p>
+            <a:r>
+              <a:rPr lang="" altLang="en-US"/>
+              <a:t>các string có số thì thêm: @ - không chuẩn hóa </a:t>
+            </a:r>
+            <a:endParaRPr lang="" altLang="en-US"/>
+          </a:p>
+          <a:p>
+            <a:r>
+              <a:rPr lang="" altLang="en-US"/>
+              <a:t>hạn chế thứ nhất là:</a:t>
+            </a:r>
+            <a:endParaRPr lang="" altLang="en-US"/>
+          </a:p>
+          <a:p>
+            <a:pPr lvl="1"/>
+            <a:r>
+              <a:rPr lang="" altLang="en-US" sz="2400"/>
+              <a:t>từ điển định danh: tên đường, huyện, tỉnh ....</a:t>
+            </a:r>
+            <a:endParaRPr lang="" altLang="en-US" sz="2400"/>
+          </a:p>
+          <a:p>
+            <a:pPr lvl="1"/>
+            <a:r>
+              <a:rPr lang="" altLang="en-US"/>
+              <a:t> </a:t>
+            </a:r>
+            <a:endParaRPr lang="" altLang="en-US"/>
           </a:p>
         </p:txBody>
       </p:sp>

</xml_diff>